<commit_message>
update slides with better psuedo examples, move css back to week 1
</commit_message>
<xml_diff>
--- a/slides/week-3.pptx
+++ b/slides/week-3.pptx
@@ -283,7 +283,7 @@
           <a:p>
             <a:fld id="{BEE89151-D79D-4EC9-9784-97880FB4680D}" type="datetimeFigureOut">
               <a:rPr lang="en-US" smtClean="0"/>
-              <a:t>11/13/2017</a:t>
+              <a:t>4/24/2018</a:t>
             </a:fld>
             <a:endParaRPr lang="en-US"/>
           </a:p>
@@ -689,7 +689,7 @@
           <a:p>
             <a:fld id="{1D8BD707-D9CF-40AE-B4C6-C98DA3205C09}" type="datetimeFigureOut">
               <a:rPr lang="en-US"/>
-              <a:t>11/13/2017</a:t>
+              <a:t>4/24/2018</a:t>
             </a:fld>
             <a:endParaRPr lang="en-US"/>
           </a:p>
@@ -872,7 +872,7 @@
           <a:p>
             <a:fld id="{1D8BD707-D9CF-40AE-B4C6-C98DA3205C09}" type="datetimeFigureOut">
               <a:rPr lang="en-US"/>
-              <a:t>11/13/2017</a:t>
+              <a:t>4/24/2018</a:t>
             </a:fld>
             <a:endParaRPr lang="en-US"/>
           </a:p>
@@ -1092,7 +1092,7 @@
           <a:p>
             <a:fld id="{1D8BD707-D9CF-40AE-B4C6-C98DA3205C09}" type="datetimeFigureOut">
               <a:rPr lang="en-US"/>
-              <a:t>11/13/2017</a:t>
+              <a:t>4/24/2018</a:t>
             </a:fld>
             <a:endParaRPr lang="en-US"/>
           </a:p>
@@ -1304,7 +1304,7 @@
           <a:p>
             <a:fld id="{1D8BD707-D9CF-40AE-B4C6-C98DA3205C09}" type="datetimeFigureOut">
               <a:rPr lang="en-US"/>
-              <a:t>11/13/2017</a:t>
+              <a:t>4/24/2018</a:t>
             </a:fld>
             <a:endParaRPr lang="en-US"/>
           </a:p>
@@ -1429,7 +1429,7 @@
           <a:p>
             <a:fld id="{1D8BD707-D9CF-40AE-B4C6-C98DA3205C09}" type="datetimeFigureOut">
               <a:rPr lang="en-US"/>
-              <a:t>11/13/2017</a:t>
+              <a:t>4/24/2018</a:t>
             </a:fld>
             <a:endParaRPr lang="en-US"/>
           </a:p>
@@ -1660,7 +1660,7 @@
           <a:p>
             <a:fld id="{1D8BD707-D9CF-40AE-B4C6-C98DA3205C09}" type="datetimeFigureOut">
               <a:rPr lang="en-US"/>
-              <a:t>11/13/2017</a:t>
+              <a:t>4/24/2018</a:t>
             </a:fld>
             <a:endParaRPr lang="en-US"/>
           </a:p>
@@ -2190,8 +2190,8 @@
         </p:nvSpPr>
         <p:spPr>
           <a:xfrm>
-            <a:off x="4096829" y="8305800"/>
-            <a:ext cx="4808220" cy="1044773"/>
+            <a:off x="4085590" y="8380581"/>
+            <a:ext cx="4808220" cy="707886"/>
           </a:xfrm>
           <a:prstGeom prst="rect">
             <a:avLst/>
@@ -2203,11 +2203,7 @@
           </a:bodyPr>
           <a:lstStyle/>
           <a:p>
-            <a:pPr marL="546100" marR="537210" algn="ctr">
-              <a:lnSpc>
-                <a:spcPct val="155800"/>
-              </a:lnSpc>
-            </a:pPr>
+            <a:pPr marL="546100" marR="537210" algn="ctr"/>
             <a:r>
               <a:rPr sz="2300" spc="-5" dirty="0">
                 <a:solidFill>
@@ -2230,11 +2226,7 @@
             </a:r>
           </a:p>
           <a:p>
-            <a:pPr marL="546100" marR="537210" algn="ctr">
-              <a:lnSpc>
-                <a:spcPct val="155800"/>
-              </a:lnSpc>
-            </a:pPr>
+            <a:pPr marL="546100" marR="537210" algn="ctr"/>
             <a:r>
               <a:rPr sz="2300" spc="-30" dirty="0">
                 <a:solidFill>
@@ -7312,7 +7304,7 @@
             </a:ln>
             <a:extLst>
               <a:ext uri="{C572A759-6A51-4108-AA02-DFA0A04FC94B}">
-                <ma14:wrappingTextBoxFlag xmlns:ma14="http://schemas.microsoft.com/office/mac/drawingml/2011/main" xmlns="" val="1"/>
+                <ma14:wrappingTextBoxFlag xmlns="" xmlns:ma14="http://schemas.microsoft.com/office/mac/drawingml/2011/main" val="1"/>
               </a:ext>
             </a:extLst>
           </p:spPr>
@@ -7362,7 +7354,7 @@
             </a:ln>
             <a:extLst>
               <a:ext uri="{C572A759-6A51-4108-AA02-DFA0A04FC94B}">
-                <ma14:wrappingTextBoxFlag xmlns:ma14="http://schemas.microsoft.com/office/mac/drawingml/2011/main" xmlns="" val="1"/>
+                <ma14:wrappingTextBoxFlag xmlns="" xmlns:ma14="http://schemas.microsoft.com/office/mac/drawingml/2011/main" val="1"/>
               </a:ext>
             </a:extLst>
           </p:spPr>
@@ -7412,7 +7404,7 @@
             </a:ln>
             <a:extLst>
               <a:ext uri="{C572A759-6A51-4108-AA02-DFA0A04FC94B}">
-                <ma14:wrappingTextBoxFlag xmlns:ma14="http://schemas.microsoft.com/office/mac/drawingml/2011/main" xmlns="" val="1"/>
+                <ma14:wrappingTextBoxFlag xmlns="" xmlns:ma14="http://schemas.microsoft.com/office/mac/drawingml/2011/main" val="1"/>
               </a:ext>
             </a:extLst>
           </p:spPr>
@@ -7462,7 +7454,7 @@
             </a:ln>
             <a:extLst>
               <a:ext uri="{C572A759-6A51-4108-AA02-DFA0A04FC94B}">
-                <ma14:wrappingTextBoxFlag xmlns:ma14="http://schemas.microsoft.com/office/mac/drawingml/2011/main" xmlns="" val="1"/>
+                <ma14:wrappingTextBoxFlag xmlns="" xmlns:ma14="http://schemas.microsoft.com/office/mac/drawingml/2011/main" val="1"/>
               </a:ext>
             </a:extLst>
           </p:spPr>
@@ -8455,7 +8447,7 @@
         <p:spPr>
           <a:xfrm>
             <a:off x="1333500" y="3111500"/>
-            <a:ext cx="10694035" cy="5078313"/>
+            <a:ext cx="10694035" cy="4570482"/>
           </a:xfrm>
           <a:prstGeom prst="rect">
             <a:avLst/>
@@ -8469,31 +8461,69 @@
           <a:p>
             <a:pPr marL="469900" indent="-457200">
               <a:lnSpc>
-                <a:spcPct val="200000"/>
+                <a:spcPct val="100000"/>
               </a:lnSpc>
               <a:buFont typeface="Arial" panose="020B0604020202020204" pitchFamily="34" charset="0"/>
               <a:buChar char="•"/>
-            </a:pPr>
-            <a:r>
-              <a:rPr sz="3300" spc="-15" dirty="0">
-                <a:solidFill>
-                  <a:srgbClr val="5F5F5F"/>
-                </a:solidFill>
-                <a:latin typeface="Georgia" panose="02040502050405020303" pitchFamily="18" charset="0"/>
-                <a:cs typeface="Lora"/>
-              </a:rPr>
-              <a:t>Review</a:t>
-            </a:r>
-            <a:r>
-              <a:rPr lang="en-US" sz="3300" spc="-15" dirty="0">
-                <a:solidFill>
-                  <a:srgbClr val="5F5F5F"/>
-                </a:solidFill>
-                <a:latin typeface="Georgia" panose="02040502050405020303" pitchFamily="18" charset="0"/>
-                <a:cs typeface="Lora"/>
-              </a:rPr>
-              <a:t> Intro to CSS</a:t>
-            </a:r>
+              <a:tabLst>
+                <a:tab pos="570865" algn="l"/>
+                <a:tab pos="571500" algn="l"/>
+              </a:tabLst>
+            </a:pPr>
+            <a:r>
+              <a:rPr lang="en-US" sz="3300" dirty="0">
+                <a:solidFill>
+                  <a:srgbClr val="5F5F5F"/>
+                </a:solidFill>
+                <a:latin typeface="Georgia"/>
+                <a:cs typeface="Georgia"/>
+              </a:rPr>
+              <a:t>Week Two </a:t>
+            </a:r>
+            <a:r>
+              <a:rPr lang="en-US" sz="3300" spc="-5" dirty="0">
+                <a:solidFill>
+                  <a:srgbClr val="5F5F5F"/>
+                </a:solidFill>
+                <a:latin typeface="Georgia"/>
+                <a:cs typeface="Georgia"/>
+              </a:rPr>
+              <a:t>review </a:t>
+            </a:r>
+            <a:r>
+              <a:rPr lang="en-US" sz="3300" dirty="0">
+                <a:solidFill>
+                  <a:srgbClr val="5F5F5F"/>
+                </a:solidFill>
+                <a:latin typeface="Georgia"/>
+                <a:cs typeface="Georgia"/>
+              </a:rPr>
+              <a:t>and</a:t>
+            </a:r>
+            <a:r>
+              <a:rPr lang="en-US" sz="3300" spc="-45" dirty="0">
+                <a:solidFill>
+                  <a:srgbClr val="5F5F5F"/>
+                </a:solidFill>
+                <a:latin typeface="Georgia"/>
+                <a:cs typeface="Georgia"/>
+              </a:rPr>
+              <a:t> </a:t>
+            </a:r>
+            <a:r>
+              <a:rPr lang="en-US" sz="3300" spc="-5" dirty="0">
+                <a:solidFill>
+                  <a:srgbClr val="5F5F5F"/>
+                </a:solidFill>
+                <a:latin typeface="Georgia"/>
+                <a:cs typeface="Georgia"/>
+              </a:rPr>
+              <a:t>questions</a:t>
+            </a:r>
+            <a:endParaRPr lang="en-US" sz="3300" dirty="0">
+              <a:latin typeface="Georgia"/>
+              <a:cs typeface="Georgia"/>
+            </a:endParaRPr>
           </a:p>
           <a:p>
             <a:pPr marL="469900" indent="-457200">

</xml_diff>